<commit_message>
Improved descriptions and Example.tex
</commit_message>
<xml_diff>
--- a/images/VT.pptx
+++ b/images/VT.pptx
@@ -5,8 +5,8 @@
     <p:sldMasterId id="2147483648" r:id="rId1"/>
   </p:sldMasterIdLst>
   <p:sldIdLst>
-    <p:sldId id="256" r:id="rId2"/>
-    <p:sldId id="257" r:id="rId3"/>
+    <p:sldId id="257" r:id="rId2"/>
+    <p:sldId id="256" r:id="rId3"/>
   </p:sldIdLst>
   <p:sldSz cx="12192000" cy="6858000"/>
   <p:notesSz cx="6858000" cy="9144000"/>
@@ -273,7 +273,7 @@
           <a:p>
             <a:fld id="{E7694E12-E099-4CC9-904C-7D8F2BBB2B1C}" type="datetimeFigureOut">
               <a:rPr lang="fr-BE" smtClean="0"/>
-              <a:t>05-07-23</a:t>
+              <a:t>10-07-23</a:t>
             </a:fld>
             <a:endParaRPr lang="fr-BE"/>
           </a:p>
@@ -473,7 +473,7 @@
           <a:p>
             <a:fld id="{E7694E12-E099-4CC9-904C-7D8F2BBB2B1C}" type="datetimeFigureOut">
               <a:rPr lang="fr-BE" smtClean="0"/>
-              <a:t>05-07-23</a:t>
+              <a:t>10-07-23</a:t>
             </a:fld>
             <a:endParaRPr lang="fr-BE"/>
           </a:p>
@@ -683,7 +683,7 @@
           <a:p>
             <a:fld id="{E7694E12-E099-4CC9-904C-7D8F2BBB2B1C}" type="datetimeFigureOut">
               <a:rPr lang="fr-BE" smtClean="0"/>
-              <a:t>05-07-23</a:t>
+              <a:t>10-07-23</a:t>
             </a:fld>
             <a:endParaRPr lang="fr-BE"/>
           </a:p>
@@ -883,7 +883,7 @@
           <a:p>
             <a:fld id="{E7694E12-E099-4CC9-904C-7D8F2BBB2B1C}" type="datetimeFigureOut">
               <a:rPr lang="fr-BE" smtClean="0"/>
-              <a:t>05-07-23</a:t>
+              <a:t>10-07-23</a:t>
             </a:fld>
             <a:endParaRPr lang="fr-BE"/>
           </a:p>
@@ -1159,7 +1159,7 @@
           <a:p>
             <a:fld id="{E7694E12-E099-4CC9-904C-7D8F2BBB2B1C}" type="datetimeFigureOut">
               <a:rPr lang="fr-BE" smtClean="0"/>
-              <a:t>05-07-23</a:t>
+              <a:t>10-07-23</a:t>
             </a:fld>
             <a:endParaRPr lang="fr-BE"/>
           </a:p>
@@ -1427,7 +1427,7 @@
           <a:p>
             <a:fld id="{E7694E12-E099-4CC9-904C-7D8F2BBB2B1C}" type="datetimeFigureOut">
               <a:rPr lang="fr-BE" smtClean="0"/>
-              <a:t>05-07-23</a:t>
+              <a:t>10-07-23</a:t>
             </a:fld>
             <a:endParaRPr lang="fr-BE"/>
           </a:p>
@@ -1842,7 +1842,7 @@
           <a:p>
             <a:fld id="{E7694E12-E099-4CC9-904C-7D8F2BBB2B1C}" type="datetimeFigureOut">
               <a:rPr lang="fr-BE" smtClean="0"/>
-              <a:t>05-07-23</a:t>
+              <a:t>10-07-23</a:t>
             </a:fld>
             <a:endParaRPr lang="fr-BE"/>
           </a:p>
@@ -1984,7 +1984,7 @@
           <a:p>
             <a:fld id="{E7694E12-E099-4CC9-904C-7D8F2BBB2B1C}" type="datetimeFigureOut">
               <a:rPr lang="fr-BE" smtClean="0"/>
-              <a:t>05-07-23</a:t>
+              <a:t>10-07-23</a:t>
             </a:fld>
             <a:endParaRPr lang="fr-BE"/>
           </a:p>
@@ -2097,7 +2097,7 @@
           <a:p>
             <a:fld id="{E7694E12-E099-4CC9-904C-7D8F2BBB2B1C}" type="datetimeFigureOut">
               <a:rPr lang="fr-BE" smtClean="0"/>
-              <a:t>05-07-23</a:t>
+              <a:t>10-07-23</a:t>
             </a:fld>
             <a:endParaRPr lang="fr-BE"/>
           </a:p>
@@ -2410,7 +2410,7 @@
           <a:p>
             <a:fld id="{E7694E12-E099-4CC9-904C-7D8F2BBB2B1C}" type="datetimeFigureOut">
               <a:rPr lang="fr-BE" smtClean="0"/>
-              <a:t>05-07-23</a:t>
+              <a:t>10-07-23</a:t>
             </a:fld>
             <a:endParaRPr lang="fr-BE"/>
           </a:p>
@@ -2699,7 +2699,7 @@
           <a:p>
             <a:fld id="{E7694E12-E099-4CC9-904C-7D8F2BBB2B1C}" type="datetimeFigureOut">
               <a:rPr lang="fr-BE" smtClean="0"/>
-              <a:t>05-07-23</a:t>
+              <a:t>10-07-23</a:t>
             </a:fld>
             <a:endParaRPr lang="fr-BE"/>
           </a:p>
@@ -2942,7 +2942,7 @@
           <a:p>
             <a:fld id="{E7694E12-E099-4CC9-904C-7D8F2BBB2B1C}" type="datetimeFigureOut">
               <a:rPr lang="fr-BE" smtClean="0"/>
-              <a:t>05-07-23</a:t>
+              <a:t>10-07-23</a:t>
             </a:fld>
             <a:endParaRPr lang="fr-BE"/>
           </a:p>
@@ -3361,6 +3361,535 @@
       </p:grpSpPr>
       <p:sp>
         <p:nvSpPr>
+          <p:cNvPr id="4" name="ZoneTexte 3">
+            <a:extLst>
+              <a:ext uri="{FF2B5EF4-FFF2-40B4-BE49-F238E27FC236}">
+                <a16:creationId xmlns:a16="http://schemas.microsoft.com/office/drawing/2014/main" id="{CDA29EBE-10D4-C07F-36BB-DA17BB5183C8}"/>
+              </a:ext>
+            </a:extLst>
+          </p:cNvPr>
+          <p:cNvSpPr txBox="1"/>
+          <p:nvPr/>
+        </p:nvSpPr>
+        <p:spPr>
+          <a:xfrm>
+            <a:off x="82193" y="82193"/>
+            <a:ext cx="2765509" cy="2308324"/>
+          </a:xfrm>
+          <a:prstGeom prst="rect">
+            <a:avLst/>
+          </a:prstGeom>
+          <a:noFill/>
+        </p:spPr>
+        <p:txBody>
+          <a:bodyPr wrap="square" rtlCol="0">
+            <a:spAutoFit/>
+          </a:bodyPr>
+          <a:lstStyle/>
+          <a:p>
+            <a:r>
+              <a:rPr lang="fr-FR" sz="1200" b="1" dirty="0" err="1">
+                <a:solidFill>
+                  <a:srgbClr val="FF0000"/>
+                </a:solidFill>
+                <a:latin typeface="Courier New" panose="02070309020205020404" pitchFamily="49" charset="0"/>
+                <a:cs typeface="Courier New" panose="02070309020205020404" pitchFamily="49" charset="0"/>
+              </a:rPr>
+              <a:t>fsm</a:t>
+            </a:r>
+            <a:r>
+              <a:rPr lang="fr-FR" sz="1200" dirty="0">
+                <a:latin typeface="Courier New" panose="02070309020205020404" pitchFamily="49" charset="0"/>
+                <a:cs typeface="Courier New" panose="02070309020205020404" pitchFamily="49" charset="0"/>
+              </a:rPr>
+              <a:t> </a:t>
+            </a:r>
+            <a:r>
+              <a:rPr lang="fr-BE" sz="1200" dirty="0">
+                <a:latin typeface="Courier New" panose="02070309020205020404" pitchFamily="49" charset="0"/>
+                <a:cs typeface="Courier New" panose="02070309020205020404" pitchFamily="49" charset="0"/>
+              </a:rPr>
+              <a:t>"</a:t>
+            </a:r>
+            <a:r>
+              <a:rPr lang="fr-FR" sz="1200" dirty="0">
+                <a:latin typeface="Courier New" panose="02070309020205020404" pitchFamily="49" charset="0"/>
+                <a:cs typeface="Courier New" panose="02070309020205020404" pitchFamily="49" charset="0"/>
+              </a:rPr>
+              <a:t>Simple FSM</a:t>
+            </a:r>
+            <a:r>
+              <a:rPr lang="fr-BE" sz="1200" dirty="0">
+                <a:latin typeface="Courier New" panose="02070309020205020404" pitchFamily="49" charset="0"/>
+                <a:cs typeface="Courier New" panose="02070309020205020404" pitchFamily="49" charset="0"/>
+              </a:rPr>
+              <a:t>"</a:t>
+            </a:r>
+            <a:endParaRPr lang="fr-FR" sz="1200" dirty="0">
+              <a:latin typeface="Courier New" panose="02070309020205020404" pitchFamily="49" charset="0"/>
+              <a:cs typeface="Courier New" panose="02070309020205020404" pitchFamily="49" charset="0"/>
+            </a:endParaRPr>
+          </a:p>
+          <a:p>
+            <a:r>
+              <a:rPr lang="fr-FR" sz="1200" b="1" dirty="0">
+                <a:solidFill>
+                  <a:srgbClr val="FF0000"/>
+                </a:solidFill>
+                <a:latin typeface="Courier New" panose="02070309020205020404" pitchFamily="49" charset="0"/>
+                <a:cs typeface="Courier New" panose="02070309020205020404" pitchFamily="49" charset="0"/>
+              </a:rPr>
+              <a:t>  </a:t>
+            </a:r>
+            <a:r>
+              <a:rPr lang="fr-FR" sz="1200" b="1" dirty="0" err="1">
+                <a:solidFill>
+                  <a:srgbClr val="FF0000"/>
+                </a:solidFill>
+                <a:latin typeface="Courier New" panose="02070309020205020404" pitchFamily="49" charset="0"/>
+                <a:cs typeface="Courier New" panose="02070309020205020404" pitchFamily="49" charset="0"/>
+              </a:rPr>
+              <a:t>number</a:t>
+            </a:r>
+            <a:r>
+              <a:rPr lang="fr-FR" sz="1200" b="1" dirty="0">
+                <a:solidFill>
+                  <a:srgbClr val="FF0000"/>
+                </a:solidFill>
+                <a:latin typeface="Courier New" panose="02070309020205020404" pitchFamily="49" charset="0"/>
+                <a:cs typeface="Courier New" panose="02070309020205020404" pitchFamily="49" charset="0"/>
+              </a:rPr>
+              <a:t> of states      = </a:t>
+            </a:r>
+            <a:r>
+              <a:rPr lang="fr-FR" sz="1200" dirty="0">
+                <a:latin typeface="Courier New" panose="02070309020205020404" pitchFamily="49" charset="0"/>
+                <a:cs typeface="Courier New" panose="02070309020205020404" pitchFamily="49" charset="0"/>
+              </a:rPr>
+              <a:t>4</a:t>
+            </a:r>
+          </a:p>
+          <a:p>
+            <a:r>
+              <a:rPr lang="fr-FR" sz="1200" b="1" dirty="0">
+                <a:solidFill>
+                  <a:srgbClr val="FF0000"/>
+                </a:solidFill>
+                <a:latin typeface="Courier New" panose="02070309020205020404" pitchFamily="49" charset="0"/>
+                <a:cs typeface="Courier New" panose="02070309020205020404" pitchFamily="49" charset="0"/>
+              </a:rPr>
+              <a:t>  </a:t>
+            </a:r>
+            <a:r>
+              <a:rPr lang="fr-FR" sz="1200" b="1" dirty="0" err="1">
+                <a:solidFill>
+                  <a:srgbClr val="FF0000"/>
+                </a:solidFill>
+                <a:latin typeface="Courier New" panose="02070309020205020404" pitchFamily="49" charset="0"/>
+                <a:cs typeface="Courier New" panose="02070309020205020404" pitchFamily="49" charset="0"/>
+              </a:rPr>
+              <a:t>number</a:t>
+            </a:r>
+            <a:r>
+              <a:rPr lang="fr-FR" sz="1200" b="1" dirty="0">
+                <a:solidFill>
+                  <a:srgbClr val="FF0000"/>
+                </a:solidFill>
+                <a:latin typeface="Courier New" panose="02070309020205020404" pitchFamily="49" charset="0"/>
+                <a:cs typeface="Courier New" panose="02070309020205020404" pitchFamily="49" charset="0"/>
+              </a:rPr>
+              <a:t> of transitions </a:t>
+            </a:r>
+            <a:r>
+              <a:rPr lang="fr-FR" sz="1200" b="1">
+                <a:solidFill>
+                  <a:srgbClr val="FF0000"/>
+                </a:solidFill>
+                <a:latin typeface="Courier New" panose="02070309020205020404" pitchFamily="49" charset="0"/>
+                <a:cs typeface="Courier New" panose="02070309020205020404" pitchFamily="49" charset="0"/>
+              </a:rPr>
+              <a:t>= </a:t>
+            </a:r>
+            <a:r>
+              <a:rPr lang="fr-FR" sz="1200">
+                <a:latin typeface="Courier New" panose="02070309020205020404" pitchFamily="49" charset="0"/>
+                <a:cs typeface="Courier New" panose="02070309020205020404" pitchFamily="49" charset="0"/>
+              </a:rPr>
+              <a:t>6</a:t>
+            </a:r>
+            <a:endParaRPr lang="fr-FR" sz="1200" dirty="0">
+              <a:latin typeface="Courier New" panose="02070309020205020404" pitchFamily="49" charset="0"/>
+              <a:cs typeface="Courier New" panose="02070309020205020404" pitchFamily="49" charset="0"/>
+            </a:endParaRPr>
+          </a:p>
+          <a:p>
+            <a:r>
+              <a:rPr lang="fr-FR" sz="1200" b="1" dirty="0">
+                <a:solidFill>
+                  <a:srgbClr val="FF0000"/>
+                </a:solidFill>
+                <a:latin typeface="Courier New" panose="02070309020205020404" pitchFamily="49" charset="0"/>
+                <a:cs typeface="Courier New" panose="02070309020205020404" pitchFamily="49" charset="0"/>
+              </a:rPr>
+              <a:t>  state</a:t>
+            </a:r>
+            <a:r>
+              <a:rPr lang="fr-FR" sz="1200" dirty="0">
+                <a:latin typeface="Courier New" panose="02070309020205020404" pitchFamily="49" charset="0"/>
+                <a:cs typeface="Courier New" panose="02070309020205020404" pitchFamily="49" charset="0"/>
+              </a:rPr>
+              <a:t> </a:t>
+            </a:r>
+            <a:r>
+              <a:rPr lang="fr-BE" sz="1200" dirty="0">
+                <a:latin typeface="Courier New" panose="02070309020205020404" pitchFamily="49" charset="0"/>
+                <a:cs typeface="Courier New" panose="02070309020205020404" pitchFamily="49" charset="0"/>
+              </a:rPr>
+              <a:t>"</a:t>
+            </a:r>
+            <a:r>
+              <a:rPr lang="fr-FR" sz="1200" dirty="0">
+                <a:latin typeface="Courier New" panose="02070309020205020404" pitchFamily="49" charset="0"/>
+                <a:cs typeface="Courier New" panose="02070309020205020404" pitchFamily="49" charset="0"/>
+              </a:rPr>
+              <a:t>1</a:t>
+            </a:r>
+            <a:r>
+              <a:rPr lang="fr-BE" sz="1200" dirty="0">
+                <a:latin typeface="Courier New" panose="02070309020205020404" pitchFamily="49" charset="0"/>
+                <a:cs typeface="Courier New" panose="02070309020205020404" pitchFamily="49" charset="0"/>
+              </a:rPr>
+              <a:t>"</a:t>
+            </a:r>
+            <a:endParaRPr lang="fr-FR" sz="1200" dirty="0">
+              <a:latin typeface="Courier New" panose="02070309020205020404" pitchFamily="49" charset="0"/>
+              <a:cs typeface="Courier New" panose="02070309020205020404" pitchFamily="49" charset="0"/>
+            </a:endParaRPr>
+          </a:p>
+          <a:p>
+            <a:r>
+              <a:rPr lang="fr-FR" sz="1200" dirty="0">
+                <a:latin typeface="Courier New" panose="02070309020205020404" pitchFamily="49" charset="0"/>
+                <a:cs typeface="Courier New" panose="02070309020205020404" pitchFamily="49" charset="0"/>
+              </a:rPr>
+              <a:t>     </a:t>
+            </a:r>
+            <a:r>
+              <a:rPr lang="fr-FR" sz="1200" b="1" dirty="0">
+                <a:solidFill>
+                  <a:srgbClr val="FF0000"/>
+                </a:solidFill>
+                <a:latin typeface="Courier New" panose="02070309020205020404" pitchFamily="49" charset="0"/>
+                <a:cs typeface="Courier New" panose="02070309020205020404" pitchFamily="49" charset="0"/>
+              </a:rPr>
+              <a:t>transition</a:t>
+            </a:r>
+            <a:r>
+              <a:rPr lang="fr-FR" sz="1200" dirty="0">
+                <a:latin typeface="Courier New" panose="02070309020205020404" pitchFamily="49" charset="0"/>
+                <a:cs typeface="Courier New" panose="02070309020205020404" pitchFamily="49" charset="0"/>
+              </a:rPr>
+              <a:t> </a:t>
+            </a:r>
+            <a:r>
+              <a:rPr lang="fr-BE" sz="1200" dirty="0">
+                <a:latin typeface="Courier New" panose="02070309020205020404" pitchFamily="49" charset="0"/>
+                <a:cs typeface="Courier New" panose="02070309020205020404" pitchFamily="49" charset="0"/>
+              </a:rPr>
+              <a:t>"</a:t>
+            </a:r>
+            <a:r>
+              <a:rPr lang="fr-FR" sz="1200" dirty="0">
+                <a:latin typeface="Courier New" panose="02070309020205020404" pitchFamily="49" charset="0"/>
+                <a:cs typeface="Courier New" panose="02070309020205020404" pitchFamily="49" charset="0"/>
+              </a:rPr>
+              <a:t>a</a:t>
+            </a:r>
+            <a:r>
+              <a:rPr lang="fr-BE" sz="1200" dirty="0">
+                <a:latin typeface="Courier New" panose="02070309020205020404" pitchFamily="49" charset="0"/>
+                <a:cs typeface="Courier New" panose="02070309020205020404" pitchFamily="49" charset="0"/>
+              </a:rPr>
+              <a:t>"</a:t>
+            </a:r>
+            <a:r>
+              <a:rPr lang="fr-FR" sz="1200" dirty="0">
+                <a:latin typeface="Courier New" panose="02070309020205020404" pitchFamily="49" charset="0"/>
+                <a:cs typeface="Courier New" panose="02070309020205020404" pitchFamily="49" charset="0"/>
+              </a:rPr>
+              <a:t> </a:t>
+            </a:r>
+            <a:r>
+              <a:rPr lang="fr-FR" sz="1200" b="1" dirty="0">
+                <a:solidFill>
+                  <a:srgbClr val="FF0000"/>
+                </a:solidFill>
+                <a:latin typeface="Courier New" panose="02070309020205020404" pitchFamily="49" charset="0"/>
+                <a:cs typeface="Courier New" panose="02070309020205020404" pitchFamily="49" charset="0"/>
+              </a:rPr>
+              <a:t>to</a:t>
+            </a:r>
+            <a:r>
+              <a:rPr lang="fr-FR" sz="1200" dirty="0">
+                <a:latin typeface="Courier New" panose="02070309020205020404" pitchFamily="49" charset="0"/>
+                <a:cs typeface="Courier New" panose="02070309020205020404" pitchFamily="49" charset="0"/>
+              </a:rPr>
+              <a:t> </a:t>
+            </a:r>
+            <a:r>
+              <a:rPr lang="fr-BE" sz="1200" dirty="0">
+                <a:latin typeface="Courier New" panose="02070309020205020404" pitchFamily="49" charset="0"/>
+                <a:cs typeface="Courier New" panose="02070309020205020404" pitchFamily="49" charset="0"/>
+              </a:rPr>
+              <a:t>"</a:t>
+            </a:r>
+            <a:r>
+              <a:rPr lang="fr-FR" sz="1200" dirty="0">
+                <a:latin typeface="Courier New" panose="02070309020205020404" pitchFamily="49" charset="0"/>
+                <a:cs typeface="Courier New" panose="02070309020205020404" pitchFamily="49" charset="0"/>
+              </a:rPr>
+              <a:t>2</a:t>
+            </a:r>
+            <a:r>
+              <a:rPr lang="fr-BE" sz="1200" dirty="0">
+                <a:latin typeface="Courier New" panose="02070309020205020404" pitchFamily="49" charset="0"/>
+                <a:cs typeface="Courier New" panose="02070309020205020404" pitchFamily="49" charset="0"/>
+              </a:rPr>
+              <a:t>"</a:t>
+            </a:r>
+            <a:endParaRPr lang="fr-FR" sz="1200" dirty="0">
+              <a:latin typeface="Courier New" panose="02070309020205020404" pitchFamily="49" charset="0"/>
+              <a:cs typeface="Courier New" panose="02070309020205020404" pitchFamily="49" charset="0"/>
+            </a:endParaRPr>
+          </a:p>
+          <a:p>
+            <a:r>
+              <a:rPr lang="fr-FR" sz="1200" b="1" dirty="0">
+                <a:solidFill>
+                  <a:srgbClr val="FF0000"/>
+                </a:solidFill>
+                <a:latin typeface="Courier New" panose="02070309020205020404" pitchFamily="49" charset="0"/>
+                <a:cs typeface="Courier New" panose="02070309020205020404" pitchFamily="49" charset="0"/>
+              </a:rPr>
+              <a:t>  </a:t>
+            </a:r>
+            <a:r>
+              <a:rPr lang="fr-FR" sz="1200" b="1" dirty="0" err="1">
+                <a:solidFill>
+                  <a:srgbClr val="FF0000"/>
+                </a:solidFill>
+                <a:latin typeface="Courier New" panose="02070309020205020404" pitchFamily="49" charset="0"/>
+                <a:cs typeface="Courier New" panose="02070309020205020404" pitchFamily="49" charset="0"/>
+              </a:rPr>
+              <a:t>endstate</a:t>
+            </a:r>
+            <a:endParaRPr lang="fr-FR" sz="1200" b="1" dirty="0">
+              <a:solidFill>
+                <a:srgbClr val="FF0000"/>
+              </a:solidFill>
+              <a:latin typeface="Courier New" panose="02070309020205020404" pitchFamily="49" charset="0"/>
+              <a:cs typeface="Courier New" panose="02070309020205020404" pitchFamily="49" charset="0"/>
+            </a:endParaRPr>
+          </a:p>
+          <a:p>
+            <a:r>
+              <a:rPr lang="fr-BE" sz="1200" b="1" dirty="0">
+                <a:solidFill>
+                  <a:srgbClr val="FF0000"/>
+                </a:solidFill>
+                <a:latin typeface="Courier New" panose="02070309020205020404" pitchFamily="49" charset="0"/>
+                <a:cs typeface="Courier New" panose="02070309020205020404" pitchFamily="49" charset="0"/>
+              </a:rPr>
+              <a:t>  state</a:t>
+            </a:r>
+            <a:r>
+              <a:rPr lang="fr-BE" sz="1200" dirty="0">
+                <a:latin typeface="Courier New" panose="02070309020205020404" pitchFamily="49" charset="0"/>
+                <a:cs typeface="Courier New" panose="02070309020205020404" pitchFamily="49" charset="0"/>
+              </a:rPr>
+              <a:t> "2"</a:t>
+            </a:r>
+          </a:p>
+          <a:p>
+            <a:r>
+              <a:rPr lang="fr-BE" sz="1200" dirty="0">
+                <a:latin typeface="Courier New" panose="02070309020205020404" pitchFamily="49" charset="0"/>
+                <a:cs typeface="Courier New" panose="02070309020205020404" pitchFamily="49" charset="0"/>
+              </a:rPr>
+              <a:t>    </a:t>
+            </a:r>
+            <a:r>
+              <a:rPr lang="fr-BE" sz="1200" b="1" dirty="0">
+                <a:solidFill>
+                  <a:srgbClr val="FF0000"/>
+                </a:solidFill>
+                <a:latin typeface="Courier New" panose="02070309020205020404" pitchFamily="49" charset="0"/>
+                <a:cs typeface="Courier New" panose="02070309020205020404" pitchFamily="49" charset="0"/>
+              </a:rPr>
+              <a:t>transition</a:t>
+            </a:r>
+            <a:r>
+              <a:rPr lang="fr-BE" sz="1200" dirty="0">
+                <a:latin typeface="Courier New" panose="02070309020205020404" pitchFamily="49" charset="0"/>
+                <a:cs typeface="Courier New" panose="02070309020205020404" pitchFamily="49" charset="0"/>
+              </a:rPr>
+              <a:t> "b" </a:t>
+            </a:r>
+            <a:r>
+              <a:rPr lang="fr-BE" sz="1200" b="1" dirty="0">
+                <a:solidFill>
+                  <a:srgbClr val="FF0000"/>
+                </a:solidFill>
+                <a:latin typeface="Courier New" panose="02070309020205020404" pitchFamily="49" charset="0"/>
+                <a:cs typeface="Courier New" panose="02070309020205020404" pitchFamily="49" charset="0"/>
+              </a:rPr>
+              <a:t>to</a:t>
+            </a:r>
+            <a:r>
+              <a:rPr lang="fr-BE" sz="1200" dirty="0">
+                <a:latin typeface="Courier New" panose="02070309020205020404" pitchFamily="49" charset="0"/>
+                <a:cs typeface="Courier New" panose="02070309020205020404" pitchFamily="49" charset="0"/>
+              </a:rPr>
+              <a:t> "1"</a:t>
+            </a:r>
+          </a:p>
+          <a:p>
+            <a:r>
+              <a:rPr lang="fr-BE" sz="1200" dirty="0">
+                <a:latin typeface="Courier New" panose="02070309020205020404" pitchFamily="49" charset="0"/>
+                <a:cs typeface="Courier New" panose="02070309020205020404" pitchFamily="49" charset="0"/>
+              </a:rPr>
+              <a:t>    </a:t>
+            </a:r>
+            <a:r>
+              <a:rPr lang="fr-BE" sz="1200" b="1" dirty="0">
+                <a:solidFill>
+                  <a:srgbClr val="FF0000"/>
+                </a:solidFill>
+                <a:latin typeface="Courier New" panose="02070309020205020404" pitchFamily="49" charset="0"/>
+                <a:cs typeface="Courier New" panose="02070309020205020404" pitchFamily="49" charset="0"/>
+              </a:rPr>
+              <a:t>transition</a:t>
+            </a:r>
+            <a:r>
+              <a:rPr lang="fr-BE" sz="1200" dirty="0">
+                <a:latin typeface="Courier New" panose="02070309020205020404" pitchFamily="49" charset="0"/>
+                <a:cs typeface="Courier New" panose="02070309020205020404" pitchFamily="49" charset="0"/>
+              </a:rPr>
+              <a:t> "c" </a:t>
+            </a:r>
+            <a:r>
+              <a:rPr lang="fr-BE" sz="1200" b="1" dirty="0">
+                <a:solidFill>
+                  <a:srgbClr val="FF0000"/>
+                </a:solidFill>
+                <a:latin typeface="Courier New" panose="02070309020205020404" pitchFamily="49" charset="0"/>
+                <a:cs typeface="Courier New" panose="02070309020205020404" pitchFamily="49" charset="0"/>
+              </a:rPr>
+              <a:t>to</a:t>
+            </a:r>
+            <a:r>
+              <a:rPr lang="fr-BE" sz="1200" dirty="0">
+                <a:latin typeface="Courier New" panose="02070309020205020404" pitchFamily="49" charset="0"/>
+                <a:cs typeface="Courier New" panose="02070309020205020404" pitchFamily="49" charset="0"/>
+              </a:rPr>
+              <a:t> "3"</a:t>
+            </a:r>
+          </a:p>
+          <a:p>
+            <a:r>
+              <a:rPr lang="fr-BE" sz="1200" b="1" dirty="0">
+                <a:solidFill>
+                  <a:srgbClr val="FF0000"/>
+                </a:solidFill>
+                <a:latin typeface="Courier New" panose="02070309020205020404" pitchFamily="49" charset="0"/>
+                <a:cs typeface="Courier New" panose="02070309020205020404" pitchFamily="49" charset="0"/>
+              </a:rPr>
+              <a:t>  </a:t>
+            </a:r>
+            <a:r>
+              <a:rPr lang="fr-BE" sz="1200" b="1" dirty="0" err="1">
+                <a:solidFill>
+                  <a:srgbClr val="FF0000"/>
+                </a:solidFill>
+                <a:latin typeface="Courier New" panose="02070309020205020404" pitchFamily="49" charset="0"/>
+                <a:cs typeface="Courier New" panose="02070309020205020404" pitchFamily="49" charset="0"/>
+              </a:rPr>
+              <a:t>endstate</a:t>
+            </a:r>
+            <a:endParaRPr lang="fr-BE" sz="1200" b="1" dirty="0">
+              <a:solidFill>
+                <a:srgbClr val="FF0000"/>
+              </a:solidFill>
+              <a:latin typeface="Courier New" panose="02070309020205020404" pitchFamily="49" charset="0"/>
+              <a:cs typeface="Courier New" panose="02070309020205020404" pitchFamily="49" charset="0"/>
+            </a:endParaRPr>
+          </a:p>
+          <a:p>
+            <a:r>
+              <a:rPr lang="fr-BE" sz="1200" b="1" dirty="0">
+                <a:solidFill>
+                  <a:srgbClr val="FF0000"/>
+                </a:solidFill>
+                <a:latin typeface="Courier New" panose="02070309020205020404" pitchFamily="49" charset="0"/>
+                <a:cs typeface="Courier New" panose="02070309020205020404" pitchFamily="49" charset="0"/>
+              </a:rPr>
+              <a:t>  ...</a:t>
+            </a:r>
+          </a:p>
+          <a:p>
+            <a:r>
+              <a:rPr lang="fr-BE" sz="1200" b="1" dirty="0" err="1">
+                <a:solidFill>
+                  <a:srgbClr val="FF0000"/>
+                </a:solidFill>
+                <a:latin typeface="Courier New" panose="02070309020205020404" pitchFamily="49" charset="0"/>
+                <a:cs typeface="Courier New" panose="02070309020205020404" pitchFamily="49" charset="0"/>
+              </a:rPr>
+              <a:t>endfsm</a:t>
+            </a:r>
+            <a:endParaRPr lang="fr-BE" sz="1200" b="1" dirty="0">
+              <a:solidFill>
+                <a:srgbClr val="FF0000"/>
+              </a:solidFill>
+              <a:latin typeface="Courier New" panose="02070309020205020404" pitchFamily="49" charset="0"/>
+              <a:cs typeface="Courier New" panose="02070309020205020404" pitchFamily="49" charset="0"/>
+            </a:endParaRPr>
+          </a:p>
+        </p:txBody>
+      </p:sp>
+    </p:spTree>
+    <p:extLst>
+      <p:ext uri="{BB962C8B-B14F-4D97-AF65-F5344CB8AC3E}">
+        <p14:creationId xmlns:p14="http://schemas.microsoft.com/office/powerpoint/2010/main" val="1531707334"/>
+      </p:ext>
+    </p:extLst>
+  </p:cSld>
+  <p:clrMapOvr>
+    <a:masterClrMapping/>
+  </p:clrMapOvr>
+</p:sld>
+</file>
+
+<file path=ppt/slides/slide2.xml><?xml version="1.0" encoding="utf-8"?>
+<p:sld xmlns:a="http://schemas.openxmlformats.org/drawingml/2006/main" xmlns:r="http://schemas.openxmlformats.org/officeDocument/2006/relationships" xmlns:p="http://schemas.openxmlformats.org/presentationml/2006/main">
+  <p:cSld>
+    <p:spTree>
+      <p:nvGrpSpPr>
+        <p:cNvPr id="1" name=""/>
+        <p:cNvGrpSpPr/>
+        <p:nvPr/>
+      </p:nvGrpSpPr>
+      <p:grpSpPr>
+        <a:xfrm>
+          <a:off x="0" y="0"/>
+          <a:ext cx="0" cy="0"/>
+          <a:chOff x="0" y="0"/>
+          <a:chExt cx="0" cy="0"/>
+        </a:xfrm>
+      </p:grpSpPr>
+      <p:sp>
+        <p:nvSpPr>
           <p:cNvPr id="4" name="Rectangle : coins arrondis 3">
             <a:extLst>
               <a:ext uri="{FF2B5EF4-FFF2-40B4-BE49-F238E27FC236}">
@@ -4346,450 +4875,6 @@
     <p:extLst>
       <p:ext uri="{BB962C8B-B14F-4D97-AF65-F5344CB8AC3E}">
         <p14:creationId xmlns:p14="http://schemas.microsoft.com/office/powerpoint/2010/main" val="2618821353"/>
-      </p:ext>
-    </p:extLst>
-  </p:cSld>
-  <p:clrMapOvr>
-    <a:masterClrMapping/>
-  </p:clrMapOvr>
-</p:sld>
-</file>
-
-<file path=ppt/slides/slide2.xml><?xml version="1.0" encoding="utf-8"?>
-<p:sld xmlns:a="http://schemas.openxmlformats.org/drawingml/2006/main" xmlns:r="http://schemas.openxmlformats.org/officeDocument/2006/relationships" xmlns:p="http://schemas.openxmlformats.org/presentationml/2006/main">
-  <p:cSld>
-    <p:spTree>
-      <p:nvGrpSpPr>
-        <p:cNvPr id="1" name=""/>
-        <p:cNvGrpSpPr/>
-        <p:nvPr/>
-      </p:nvGrpSpPr>
-      <p:grpSpPr>
-        <a:xfrm>
-          <a:off x="0" y="0"/>
-          <a:ext cx="0" cy="0"/>
-          <a:chOff x="0" y="0"/>
-          <a:chExt cx="0" cy="0"/>
-        </a:xfrm>
-      </p:grpSpPr>
-      <p:sp>
-        <p:nvSpPr>
-          <p:cNvPr id="4" name="ZoneTexte 3">
-            <a:extLst>
-              <a:ext uri="{FF2B5EF4-FFF2-40B4-BE49-F238E27FC236}">
-                <a16:creationId xmlns:a16="http://schemas.microsoft.com/office/drawing/2014/main" id="{CDA29EBE-10D4-C07F-36BB-DA17BB5183C8}"/>
-              </a:ext>
-            </a:extLst>
-          </p:cNvPr>
-          <p:cNvSpPr txBox="1"/>
-          <p:nvPr/>
-        </p:nvSpPr>
-        <p:spPr>
-          <a:xfrm>
-            <a:off x="82194" y="82193"/>
-            <a:ext cx="2589088" cy="1938992"/>
-          </a:xfrm>
-          <a:prstGeom prst="rect">
-            <a:avLst/>
-          </a:prstGeom>
-          <a:noFill/>
-        </p:spPr>
-        <p:txBody>
-          <a:bodyPr wrap="square" rtlCol="0">
-            <a:spAutoFit/>
-          </a:bodyPr>
-          <a:lstStyle/>
-          <a:p>
-            <a:r>
-              <a:rPr lang="fr-FR" sz="1200" b="1" dirty="0" err="1">
-                <a:solidFill>
-                  <a:srgbClr val="FF0000"/>
-                </a:solidFill>
-                <a:latin typeface="Courier New" panose="02070309020205020404" pitchFamily="49" charset="0"/>
-                <a:cs typeface="Courier New" panose="02070309020205020404" pitchFamily="49" charset="0"/>
-              </a:rPr>
-              <a:t>fsm</a:t>
-            </a:r>
-            <a:r>
-              <a:rPr lang="fr-FR" sz="1200" dirty="0">
-                <a:latin typeface="Courier New" panose="02070309020205020404" pitchFamily="49" charset="0"/>
-                <a:cs typeface="Courier New" panose="02070309020205020404" pitchFamily="49" charset="0"/>
-              </a:rPr>
-              <a:t> </a:t>
-            </a:r>
-            <a:r>
-              <a:rPr lang="fr-BE" sz="1200" dirty="0">
-                <a:latin typeface="Courier New" panose="02070309020205020404" pitchFamily="49" charset="0"/>
-                <a:cs typeface="Courier New" panose="02070309020205020404" pitchFamily="49" charset="0"/>
-              </a:rPr>
-              <a:t>"</a:t>
-            </a:r>
-            <a:r>
-              <a:rPr lang="fr-FR" sz="1200" dirty="0">
-                <a:latin typeface="Courier New" panose="02070309020205020404" pitchFamily="49" charset="0"/>
-                <a:cs typeface="Courier New" panose="02070309020205020404" pitchFamily="49" charset="0"/>
-              </a:rPr>
-              <a:t>Simple FSM</a:t>
-            </a:r>
-            <a:r>
-              <a:rPr lang="fr-BE" sz="1200" dirty="0">
-                <a:latin typeface="Courier New" panose="02070309020205020404" pitchFamily="49" charset="0"/>
-                <a:cs typeface="Courier New" panose="02070309020205020404" pitchFamily="49" charset="0"/>
-              </a:rPr>
-              <a:t>"</a:t>
-            </a:r>
-            <a:endParaRPr lang="fr-FR" sz="1200" dirty="0">
-              <a:latin typeface="Courier New" panose="02070309020205020404" pitchFamily="49" charset="0"/>
-              <a:cs typeface="Courier New" panose="02070309020205020404" pitchFamily="49" charset="0"/>
-            </a:endParaRPr>
-          </a:p>
-          <a:p>
-            <a:r>
-              <a:rPr lang="fr-FR" sz="1200" b="1" dirty="0">
-                <a:solidFill>
-                  <a:srgbClr val="FF0000"/>
-                </a:solidFill>
-                <a:latin typeface="Courier New" panose="02070309020205020404" pitchFamily="49" charset="0"/>
-                <a:cs typeface="Courier New" panose="02070309020205020404" pitchFamily="49" charset="0"/>
-              </a:rPr>
-              <a:t>  state</a:t>
-            </a:r>
-            <a:r>
-              <a:rPr lang="fr-FR" sz="1200" dirty="0">
-                <a:latin typeface="Courier New" panose="02070309020205020404" pitchFamily="49" charset="0"/>
-                <a:cs typeface="Courier New" panose="02070309020205020404" pitchFamily="49" charset="0"/>
-              </a:rPr>
-              <a:t> </a:t>
-            </a:r>
-            <a:r>
-              <a:rPr lang="fr-BE" sz="1200" dirty="0">
-                <a:latin typeface="Courier New" panose="02070309020205020404" pitchFamily="49" charset="0"/>
-                <a:cs typeface="Courier New" panose="02070309020205020404" pitchFamily="49" charset="0"/>
-              </a:rPr>
-              <a:t>"</a:t>
-            </a:r>
-            <a:r>
-              <a:rPr lang="fr-FR" sz="1200" dirty="0">
-                <a:latin typeface="Courier New" panose="02070309020205020404" pitchFamily="49" charset="0"/>
-                <a:cs typeface="Courier New" panose="02070309020205020404" pitchFamily="49" charset="0"/>
-              </a:rPr>
-              <a:t>1</a:t>
-            </a:r>
-            <a:r>
-              <a:rPr lang="fr-BE" sz="1200" dirty="0">
-                <a:latin typeface="Courier New" panose="02070309020205020404" pitchFamily="49" charset="0"/>
-                <a:cs typeface="Courier New" panose="02070309020205020404" pitchFamily="49" charset="0"/>
-              </a:rPr>
-              <a:t>"</a:t>
-            </a:r>
-            <a:endParaRPr lang="fr-FR" sz="1200" dirty="0">
-              <a:latin typeface="Courier New" panose="02070309020205020404" pitchFamily="49" charset="0"/>
-              <a:cs typeface="Courier New" panose="02070309020205020404" pitchFamily="49" charset="0"/>
-            </a:endParaRPr>
-          </a:p>
-          <a:p>
-            <a:r>
-              <a:rPr lang="fr-FR" sz="1200" dirty="0">
-                <a:latin typeface="Courier New" panose="02070309020205020404" pitchFamily="49" charset="0"/>
-                <a:cs typeface="Courier New" panose="02070309020205020404" pitchFamily="49" charset="0"/>
-              </a:rPr>
-              <a:t>     </a:t>
-            </a:r>
-            <a:r>
-              <a:rPr lang="fr-FR" sz="1200" b="1" dirty="0">
-                <a:solidFill>
-                  <a:srgbClr val="FF0000"/>
-                </a:solidFill>
-                <a:latin typeface="Courier New" panose="02070309020205020404" pitchFamily="49" charset="0"/>
-                <a:cs typeface="Courier New" panose="02070309020205020404" pitchFamily="49" charset="0"/>
-              </a:rPr>
-              <a:t>transition</a:t>
-            </a:r>
-            <a:r>
-              <a:rPr lang="fr-FR" sz="1200" dirty="0">
-                <a:latin typeface="Courier New" panose="02070309020205020404" pitchFamily="49" charset="0"/>
-                <a:cs typeface="Courier New" panose="02070309020205020404" pitchFamily="49" charset="0"/>
-              </a:rPr>
-              <a:t> </a:t>
-            </a:r>
-            <a:r>
-              <a:rPr lang="fr-BE" sz="1200" dirty="0">
-                <a:latin typeface="Courier New" panose="02070309020205020404" pitchFamily="49" charset="0"/>
-                <a:cs typeface="Courier New" panose="02070309020205020404" pitchFamily="49" charset="0"/>
-              </a:rPr>
-              <a:t>"</a:t>
-            </a:r>
-            <a:r>
-              <a:rPr lang="fr-FR" sz="1200" dirty="0">
-                <a:latin typeface="Courier New" panose="02070309020205020404" pitchFamily="49" charset="0"/>
-                <a:cs typeface="Courier New" panose="02070309020205020404" pitchFamily="49" charset="0"/>
-              </a:rPr>
-              <a:t>a</a:t>
-            </a:r>
-            <a:r>
-              <a:rPr lang="fr-BE" sz="1200" dirty="0">
-                <a:latin typeface="Courier New" panose="02070309020205020404" pitchFamily="49" charset="0"/>
-                <a:cs typeface="Courier New" panose="02070309020205020404" pitchFamily="49" charset="0"/>
-              </a:rPr>
-              <a:t>"</a:t>
-            </a:r>
-            <a:r>
-              <a:rPr lang="fr-FR" sz="1200" dirty="0">
-                <a:latin typeface="Courier New" panose="02070309020205020404" pitchFamily="49" charset="0"/>
-                <a:cs typeface="Courier New" panose="02070309020205020404" pitchFamily="49" charset="0"/>
-              </a:rPr>
-              <a:t> </a:t>
-            </a:r>
-            <a:r>
-              <a:rPr lang="fr-FR" sz="1200" b="1" dirty="0">
-                <a:solidFill>
-                  <a:srgbClr val="FF0000"/>
-                </a:solidFill>
-                <a:latin typeface="Courier New" panose="02070309020205020404" pitchFamily="49" charset="0"/>
-                <a:cs typeface="Courier New" panose="02070309020205020404" pitchFamily="49" charset="0"/>
-              </a:rPr>
-              <a:t>to</a:t>
-            </a:r>
-            <a:r>
-              <a:rPr lang="fr-FR" sz="1200" dirty="0">
-                <a:latin typeface="Courier New" panose="02070309020205020404" pitchFamily="49" charset="0"/>
-                <a:cs typeface="Courier New" panose="02070309020205020404" pitchFamily="49" charset="0"/>
-              </a:rPr>
-              <a:t> </a:t>
-            </a:r>
-            <a:r>
-              <a:rPr lang="fr-BE" sz="1200" dirty="0">
-                <a:latin typeface="Courier New" panose="02070309020205020404" pitchFamily="49" charset="0"/>
-                <a:cs typeface="Courier New" panose="02070309020205020404" pitchFamily="49" charset="0"/>
-              </a:rPr>
-              <a:t>"</a:t>
-            </a:r>
-            <a:r>
-              <a:rPr lang="fr-FR" sz="1200" dirty="0">
-                <a:latin typeface="Courier New" panose="02070309020205020404" pitchFamily="49" charset="0"/>
-                <a:cs typeface="Courier New" panose="02070309020205020404" pitchFamily="49" charset="0"/>
-              </a:rPr>
-              <a:t>2</a:t>
-            </a:r>
-            <a:r>
-              <a:rPr lang="fr-BE" sz="1200" dirty="0">
-                <a:latin typeface="Courier New" panose="02070309020205020404" pitchFamily="49" charset="0"/>
-                <a:cs typeface="Courier New" panose="02070309020205020404" pitchFamily="49" charset="0"/>
-              </a:rPr>
-              <a:t>"</a:t>
-            </a:r>
-            <a:endParaRPr lang="fr-FR" sz="1200" dirty="0">
-              <a:latin typeface="Courier New" panose="02070309020205020404" pitchFamily="49" charset="0"/>
-              <a:cs typeface="Courier New" panose="02070309020205020404" pitchFamily="49" charset="0"/>
-            </a:endParaRPr>
-          </a:p>
-          <a:p>
-            <a:r>
-              <a:rPr lang="fr-FR" sz="1200" b="1" dirty="0">
-                <a:solidFill>
-                  <a:srgbClr val="FF0000"/>
-                </a:solidFill>
-                <a:latin typeface="Courier New" panose="02070309020205020404" pitchFamily="49" charset="0"/>
-                <a:cs typeface="Courier New" panose="02070309020205020404" pitchFamily="49" charset="0"/>
-              </a:rPr>
-              <a:t>  </a:t>
-            </a:r>
-            <a:r>
-              <a:rPr lang="fr-FR" sz="1200" b="1" dirty="0" err="1">
-                <a:solidFill>
-                  <a:srgbClr val="FF0000"/>
-                </a:solidFill>
-                <a:latin typeface="Courier New" panose="02070309020205020404" pitchFamily="49" charset="0"/>
-                <a:cs typeface="Courier New" panose="02070309020205020404" pitchFamily="49" charset="0"/>
-              </a:rPr>
-              <a:t>endstate</a:t>
-            </a:r>
-            <a:endParaRPr lang="fr-FR" sz="1200" b="1" dirty="0">
-              <a:solidFill>
-                <a:srgbClr val="FF0000"/>
-              </a:solidFill>
-              <a:latin typeface="Courier New" panose="02070309020205020404" pitchFamily="49" charset="0"/>
-              <a:cs typeface="Courier New" panose="02070309020205020404" pitchFamily="49" charset="0"/>
-            </a:endParaRPr>
-          </a:p>
-          <a:p>
-            <a:r>
-              <a:rPr lang="fr-BE" sz="1200" b="1" dirty="0">
-                <a:solidFill>
-                  <a:srgbClr val="FF0000"/>
-                </a:solidFill>
-                <a:latin typeface="Courier New" panose="02070309020205020404" pitchFamily="49" charset="0"/>
-                <a:cs typeface="Courier New" panose="02070309020205020404" pitchFamily="49" charset="0"/>
-              </a:rPr>
-              <a:t>  state</a:t>
-            </a:r>
-            <a:r>
-              <a:rPr lang="fr-BE" sz="1200" dirty="0">
-                <a:latin typeface="Courier New" panose="02070309020205020404" pitchFamily="49" charset="0"/>
-                <a:cs typeface="Courier New" panose="02070309020205020404" pitchFamily="49" charset="0"/>
-              </a:rPr>
-              <a:t> "2"</a:t>
-            </a:r>
-          </a:p>
-          <a:p>
-            <a:r>
-              <a:rPr lang="fr-BE" sz="1200" dirty="0">
-                <a:latin typeface="Courier New" panose="02070309020205020404" pitchFamily="49" charset="0"/>
-                <a:cs typeface="Courier New" panose="02070309020205020404" pitchFamily="49" charset="0"/>
-              </a:rPr>
-              <a:t>    </a:t>
-            </a:r>
-            <a:r>
-              <a:rPr lang="fr-BE" sz="1200" b="1" dirty="0">
-                <a:solidFill>
-                  <a:srgbClr val="FF0000"/>
-                </a:solidFill>
-                <a:latin typeface="Courier New" panose="02070309020205020404" pitchFamily="49" charset="0"/>
-                <a:cs typeface="Courier New" panose="02070309020205020404" pitchFamily="49" charset="0"/>
-              </a:rPr>
-              <a:t>transition</a:t>
-            </a:r>
-            <a:r>
-              <a:rPr lang="fr-BE" sz="1200" dirty="0">
-                <a:latin typeface="Courier New" panose="02070309020205020404" pitchFamily="49" charset="0"/>
-                <a:cs typeface="Courier New" panose="02070309020205020404" pitchFamily="49" charset="0"/>
-              </a:rPr>
-              <a:t> "b" </a:t>
-            </a:r>
-            <a:r>
-              <a:rPr lang="fr-BE" sz="1200" b="1" dirty="0">
-                <a:solidFill>
-                  <a:srgbClr val="FF0000"/>
-                </a:solidFill>
-                <a:latin typeface="Courier New" panose="02070309020205020404" pitchFamily="49" charset="0"/>
-                <a:cs typeface="Courier New" panose="02070309020205020404" pitchFamily="49" charset="0"/>
-              </a:rPr>
-              <a:t>to</a:t>
-            </a:r>
-            <a:r>
-              <a:rPr lang="fr-BE" sz="1200" dirty="0">
-                <a:latin typeface="Courier New" panose="02070309020205020404" pitchFamily="49" charset="0"/>
-                <a:cs typeface="Courier New" panose="02070309020205020404" pitchFamily="49" charset="0"/>
-              </a:rPr>
-              <a:t> "1"</a:t>
-            </a:r>
-          </a:p>
-          <a:p>
-            <a:r>
-              <a:rPr lang="fr-BE" sz="1200" dirty="0">
-                <a:latin typeface="Courier New" panose="02070309020205020404" pitchFamily="49" charset="0"/>
-                <a:cs typeface="Courier New" panose="02070309020205020404" pitchFamily="49" charset="0"/>
-              </a:rPr>
-              <a:t>    </a:t>
-            </a:r>
-            <a:r>
-              <a:rPr lang="fr-BE" sz="1200" b="1" dirty="0">
-                <a:solidFill>
-                  <a:srgbClr val="FF0000"/>
-                </a:solidFill>
-                <a:latin typeface="Courier New" panose="02070309020205020404" pitchFamily="49" charset="0"/>
-                <a:cs typeface="Courier New" panose="02070309020205020404" pitchFamily="49" charset="0"/>
-              </a:rPr>
-              <a:t>transition</a:t>
-            </a:r>
-            <a:r>
-              <a:rPr lang="fr-BE" sz="1200" dirty="0">
-                <a:latin typeface="Courier New" panose="02070309020205020404" pitchFamily="49" charset="0"/>
-                <a:cs typeface="Courier New" panose="02070309020205020404" pitchFamily="49" charset="0"/>
-              </a:rPr>
-              <a:t> "c" </a:t>
-            </a:r>
-            <a:r>
-              <a:rPr lang="fr-BE" sz="1200" b="1" dirty="0">
-                <a:solidFill>
-                  <a:srgbClr val="FF0000"/>
-                </a:solidFill>
-                <a:latin typeface="Courier New" panose="02070309020205020404" pitchFamily="49" charset="0"/>
-                <a:cs typeface="Courier New" panose="02070309020205020404" pitchFamily="49" charset="0"/>
-              </a:rPr>
-              <a:t>to</a:t>
-            </a:r>
-            <a:r>
-              <a:rPr lang="fr-BE" sz="1200" dirty="0">
-                <a:latin typeface="Courier New" panose="02070309020205020404" pitchFamily="49" charset="0"/>
-                <a:cs typeface="Courier New" panose="02070309020205020404" pitchFamily="49" charset="0"/>
-              </a:rPr>
-              <a:t> "3"</a:t>
-            </a:r>
-          </a:p>
-          <a:p>
-            <a:r>
-              <a:rPr lang="fr-BE" sz="1200" b="1" dirty="0">
-                <a:solidFill>
-                  <a:srgbClr val="FF0000"/>
-                </a:solidFill>
-                <a:latin typeface="Courier New" panose="02070309020205020404" pitchFamily="49" charset="0"/>
-                <a:cs typeface="Courier New" panose="02070309020205020404" pitchFamily="49" charset="0"/>
-              </a:rPr>
-              <a:t>  </a:t>
-            </a:r>
-            <a:r>
-              <a:rPr lang="fr-BE" sz="1200" b="1" dirty="0" err="1">
-                <a:solidFill>
-                  <a:srgbClr val="FF0000"/>
-                </a:solidFill>
-                <a:latin typeface="Courier New" panose="02070309020205020404" pitchFamily="49" charset="0"/>
-                <a:cs typeface="Courier New" panose="02070309020205020404" pitchFamily="49" charset="0"/>
-              </a:rPr>
-              <a:t>endstate</a:t>
-            </a:r>
-            <a:endParaRPr lang="fr-BE" sz="1200" b="1" dirty="0">
-              <a:solidFill>
-                <a:srgbClr val="FF0000"/>
-              </a:solidFill>
-              <a:latin typeface="Courier New" panose="02070309020205020404" pitchFamily="49" charset="0"/>
-              <a:cs typeface="Courier New" panose="02070309020205020404" pitchFamily="49" charset="0"/>
-            </a:endParaRPr>
-          </a:p>
-          <a:p>
-            <a:r>
-              <a:rPr lang="fr-BE" sz="1200" b="1">
-                <a:solidFill>
-                  <a:srgbClr val="FF0000"/>
-                </a:solidFill>
-                <a:latin typeface="Courier New" panose="02070309020205020404" pitchFamily="49" charset="0"/>
-                <a:cs typeface="Courier New" panose="02070309020205020404" pitchFamily="49" charset="0"/>
-              </a:rPr>
-              <a:t>  ...</a:t>
-            </a:r>
-            <a:endParaRPr lang="fr-BE" sz="1200" b="1" dirty="0">
-              <a:solidFill>
-                <a:srgbClr val="FF0000"/>
-              </a:solidFill>
-              <a:latin typeface="Courier New" panose="02070309020205020404" pitchFamily="49" charset="0"/>
-              <a:cs typeface="Courier New" panose="02070309020205020404" pitchFamily="49" charset="0"/>
-            </a:endParaRPr>
-          </a:p>
-          <a:p>
-            <a:r>
-              <a:rPr lang="fr-BE" sz="1200" b="1" dirty="0" err="1">
-                <a:solidFill>
-                  <a:srgbClr val="FF0000"/>
-                </a:solidFill>
-                <a:latin typeface="Courier New" panose="02070309020205020404" pitchFamily="49" charset="0"/>
-                <a:cs typeface="Courier New" panose="02070309020205020404" pitchFamily="49" charset="0"/>
-              </a:rPr>
-              <a:t>endfsm</a:t>
-            </a:r>
-            <a:endParaRPr lang="fr-BE" sz="1200" b="1" dirty="0">
-              <a:solidFill>
-                <a:srgbClr val="FF0000"/>
-              </a:solidFill>
-              <a:latin typeface="Courier New" panose="02070309020205020404" pitchFamily="49" charset="0"/>
-              <a:cs typeface="Courier New" panose="02070309020205020404" pitchFamily="49" charset="0"/>
-            </a:endParaRPr>
-          </a:p>
-        </p:txBody>
-      </p:sp>
-    </p:spTree>
-    <p:extLst>
-      <p:ext uri="{BB962C8B-B14F-4D97-AF65-F5344CB8AC3E}">
-        <p14:creationId xmlns:p14="http://schemas.microsoft.com/office/powerpoint/2010/main" val="1531707334"/>
       </p:ext>
     </p:extLst>
   </p:cSld>

</xml_diff>

<commit_message>
Improvements and minor typos/corrections
</commit_message>
<xml_diff>
--- a/images/VT.pptx
+++ b/images/VT.pptx
@@ -273,7 +273,7 @@
           <a:p>
             <a:fld id="{E7694E12-E099-4CC9-904C-7D8F2BBB2B1C}" type="datetimeFigureOut">
               <a:rPr lang="fr-BE" smtClean="0"/>
-              <a:t>10-07-23</a:t>
+              <a:t>24-07-23</a:t>
             </a:fld>
             <a:endParaRPr lang="fr-BE"/>
           </a:p>
@@ -473,7 +473,7 @@
           <a:p>
             <a:fld id="{E7694E12-E099-4CC9-904C-7D8F2BBB2B1C}" type="datetimeFigureOut">
               <a:rPr lang="fr-BE" smtClean="0"/>
-              <a:t>10-07-23</a:t>
+              <a:t>24-07-23</a:t>
             </a:fld>
             <a:endParaRPr lang="fr-BE"/>
           </a:p>
@@ -683,7 +683,7 @@
           <a:p>
             <a:fld id="{E7694E12-E099-4CC9-904C-7D8F2BBB2B1C}" type="datetimeFigureOut">
               <a:rPr lang="fr-BE" smtClean="0"/>
-              <a:t>10-07-23</a:t>
+              <a:t>24-07-23</a:t>
             </a:fld>
             <a:endParaRPr lang="fr-BE"/>
           </a:p>
@@ -883,7 +883,7 @@
           <a:p>
             <a:fld id="{E7694E12-E099-4CC9-904C-7D8F2BBB2B1C}" type="datetimeFigureOut">
               <a:rPr lang="fr-BE" smtClean="0"/>
-              <a:t>10-07-23</a:t>
+              <a:t>24-07-23</a:t>
             </a:fld>
             <a:endParaRPr lang="fr-BE"/>
           </a:p>
@@ -1159,7 +1159,7 @@
           <a:p>
             <a:fld id="{E7694E12-E099-4CC9-904C-7D8F2BBB2B1C}" type="datetimeFigureOut">
               <a:rPr lang="fr-BE" smtClean="0"/>
-              <a:t>10-07-23</a:t>
+              <a:t>24-07-23</a:t>
             </a:fld>
             <a:endParaRPr lang="fr-BE"/>
           </a:p>
@@ -1427,7 +1427,7 @@
           <a:p>
             <a:fld id="{E7694E12-E099-4CC9-904C-7D8F2BBB2B1C}" type="datetimeFigureOut">
               <a:rPr lang="fr-BE" smtClean="0"/>
-              <a:t>10-07-23</a:t>
+              <a:t>24-07-23</a:t>
             </a:fld>
             <a:endParaRPr lang="fr-BE"/>
           </a:p>
@@ -1842,7 +1842,7 @@
           <a:p>
             <a:fld id="{E7694E12-E099-4CC9-904C-7D8F2BBB2B1C}" type="datetimeFigureOut">
               <a:rPr lang="fr-BE" smtClean="0"/>
-              <a:t>10-07-23</a:t>
+              <a:t>24-07-23</a:t>
             </a:fld>
             <a:endParaRPr lang="fr-BE"/>
           </a:p>
@@ -1984,7 +1984,7 @@
           <a:p>
             <a:fld id="{E7694E12-E099-4CC9-904C-7D8F2BBB2B1C}" type="datetimeFigureOut">
               <a:rPr lang="fr-BE" smtClean="0"/>
-              <a:t>10-07-23</a:t>
+              <a:t>24-07-23</a:t>
             </a:fld>
             <a:endParaRPr lang="fr-BE"/>
           </a:p>
@@ -2097,7 +2097,7 @@
           <a:p>
             <a:fld id="{E7694E12-E099-4CC9-904C-7D8F2BBB2B1C}" type="datetimeFigureOut">
               <a:rPr lang="fr-BE" smtClean="0"/>
-              <a:t>10-07-23</a:t>
+              <a:t>24-07-23</a:t>
             </a:fld>
             <a:endParaRPr lang="fr-BE"/>
           </a:p>
@@ -2410,7 +2410,7 @@
           <a:p>
             <a:fld id="{E7694E12-E099-4CC9-904C-7D8F2BBB2B1C}" type="datetimeFigureOut">
               <a:rPr lang="fr-BE" smtClean="0"/>
-              <a:t>10-07-23</a:t>
+              <a:t>24-07-23</a:t>
             </a:fld>
             <a:endParaRPr lang="fr-BE"/>
           </a:p>
@@ -2699,7 +2699,7 @@
           <a:p>
             <a:fld id="{E7694E12-E099-4CC9-904C-7D8F2BBB2B1C}" type="datetimeFigureOut">
               <a:rPr lang="fr-BE" smtClean="0"/>
-              <a:t>10-07-23</a:t>
+              <a:t>24-07-23</a:t>
             </a:fld>
             <a:endParaRPr lang="fr-BE"/>
           </a:p>
@@ -2942,7 +2942,7 @@
           <a:p>
             <a:fld id="{E7694E12-E099-4CC9-904C-7D8F2BBB2B1C}" type="datetimeFigureOut">
               <a:rPr lang="fr-BE" smtClean="0"/>
-              <a:t>10-07-23</a:t>
+              <a:t>24-07-23</a:t>
             </a:fld>
             <a:endParaRPr lang="fr-BE"/>
           </a:p>
@@ -3374,7 +3374,7 @@
         <p:spPr>
           <a:xfrm>
             <a:off x="82193" y="82193"/>
-            <a:ext cx="2765509" cy="2308324"/>
+            <a:ext cx="2765509" cy="1200329"/>
           </a:xfrm>
           <a:prstGeom prst="rect">
             <a:avLst/>
@@ -3498,29 +3498,15 @@
                 <a:latin typeface="Courier New" panose="02070309020205020404" pitchFamily="49" charset="0"/>
                 <a:cs typeface="Courier New" panose="02070309020205020404" pitchFamily="49" charset="0"/>
               </a:rPr>
-              <a:t> of transitions </a:t>
-            </a:r>
-            <a:r>
-              <a:rPr lang="fr-FR" sz="1200" b="1">
-                <a:solidFill>
-                  <a:srgbClr val="FF0000"/>
-                </a:solidFill>
-                <a:latin typeface="Courier New" panose="02070309020205020404" pitchFamily="49" charset="0"/>
-                <a:cs typeface="Courier New" panose="02070309020205020404" pitchFamily="49" charset="0"/>
-              </a:rPr>
-              <a:t>= </a:t>
-            </a:r>
-            <a:r>
-              <a:rPr lang="fr-FR" sz="1200">
+              <a:t> of transitions = </a:t>
+            </a:r>
+            <a:r>
+              <a:rPr lang="fr-FR" sz="1200" dirty="0">
                 <a:latin typeface="Courier New" panose="02070309020205020404" pitchFamily="49" charset="0"/>
                 <a:cs typeface="Courier New" panose="02070309020205020404" pitchFamily="49" charset="0"/>
               </a:rPr>
               <a:t>6</a:t>
             </a:r>
-            <a:endParaRPr lang="fr-FR" sz="1200" dirty="0">
-              <a:latin typeface="Courier New" panose="02070309020205020404" pitchFamily="49" charset="0"/>
-              <a:cs typeface="Courier New" panose="02070309020205020404" pitchFamily="49" charset="0"/>
-            </a:endParaRPr>
           </a:p>
           <a:p>
             <a:r>
@@ -3691,6 +3677,35 @@
               <a:cs typeface="Courier New" panose="02070309020205020404" pitchFamily="49" charset="0"/>
             </a:endParaRPr>
           </a:p>
+        </p:txBody>
+      </p:sp>
+      <p:sp>
+        <p:nvSpPr>
+          <p:cNvPr id="2" name="ZoneTexte 1">
+            <a:extLst>
+              <a:ext uri="{FF2B5EF4-FFF2-40B4-BE49-F238E27FC236}">
+                <a16:creationId xmlns:a16="http://schemas.microsoft.com/office/drawing/2014/main" id="{45E2EA83-A899-73A5-3B40-140C05BD2939}"/>
+              </a:ext>
+            </a:extLst>
+          </p:cNvPr>
+          <p:cNvSpPr txBox="1"/>
+          <p:nvPr/>
+        </p:nvSpPr>
+        <p:spPr>
+          <a:xfrm>
+            <a:off x="3025691" y="82193"/>
+            <a:ext cx="2765509" cy="1200329"/>
+          </a:xfrm>
+          <a:prstGeom prst="rect">
+            <a:avLst/>
+          </a:prstGeom>
+          <a:noFill/>
+        </p:spPr>
+        <p:txBody>
+          <a:bodyPr wrap="square" rtlCol="0">
+            <a:spAutoFit/>
+          </a:bodyPr>
+          <a:lstStyle/>
           <a:p>
             <a:r>
               <a:rPr lang="fr-BE" sz="1200" b="1" dirty="0">
@@ -3700,7 +3715,7 @@
                 <a:latin typeface="Courier New" panose="02070309020205020404" pitchFamily="49" charset="0"/>
                 <a:cs typeface="Courier New" panose="02070309020205020404" pitchFamily="49" charset="0"/>
               </a:rPr>
-              <a:t>  state</a:t>
+              <a:t>state</a:t>
             </a:r>
             <a:r>
               <a:rPr lang="fr-BE" sz="1200" dirty="0">

</xml_diff>